<commit_message>
Calculation of box temp.
</commit_message>
<xml_diff>
--- a/presentation.pptx
+++ b/presentation.pptx
@@ -9,8 +9,9 @@
     <p:sldId id="258" r:id="rId3"/>
     <p:sldId id="259" r:id="rId4"/>
     <p:sldId id="257" r:id="rId5"/>
-    <p:sldId id="261" r:id="rId6"/>
-    <p:sldId id="260" r:id="rId7"/>
+    <p:sldId id="262" r:id="rId6"/>
+    <p:sldId id="261" r:id="rId7"/>
+    <p:sldId id="260" r:id="rId8"/>
   </p:sldIdLst>
   <p:sldSz cx="12192000" cy="6858000"/>
   <p:notesSz cx="6858000" cy="9144000"/>
@@ -248,7 +249,7 @@
           <a:p>
             <a:fld id="{AF9E89F8-092D-4D69-ACCB-27EB5FCC0EF4}" type="datetimeFigureOut">
               <a:rPr lang="tr-TR" smtClean="0"/>
-              <a:t>7.11.2019</a:t>
+              <a:t>14.11.2019</a:t>
             </a:fld>
             <a:endParaRPr lang="tr-TR"/>
           </a:p>
@@ -418,7 +419,7 @@
           <a:p>
             <a:fld id="{AF9E89F8-092D-4D69-ACCB-27EB5FCC0EF4}" type="datetimeFigureOut">
               <a:rPr lang="tr-TR" smtClean="0"/>
-              <a:t>7.11.2019</a:t>
+              <a:t>14.11.2019</a:t>
             </a:fld>
             <a:endParaRPr lang="tr-TR"/>
           </a:p>
@@ -598,7 +599,7 @@
           <a:p>
             <a:fld id="{AF9E89F8-092D-4D69-ACCB-27EB5FCC0EF4}" type="datetimeFigureOut">
               <a:rPr lang="tr-TR" smtClean="0"/>
-              <a:t>7.11.2019</a:t>
+              <a:t>14.11.2019</a:t>
             </a:fld>
             <a:endParaRPr lang="tr-TR"/>
           </a:p>
@@ -768,7 +769,7 @@
           <a:p>
             <a:fld id="{AF9E89F8-092D-4D69-ACCB-27EB5FCC0EF4}" type="datetimeFigureOut">
               <a:rPr lang="tr-TR" smtClean="0"/>
-              <a:t>7.11.2019</a:t>
+              <a:t>14.11.2019</a:t>
             </a:fld>
             <a:endParaRPr lang="tr-TR"/>
           </a:p>
@@ -1014,7 +1015,7 @@
           <a:p>
             <a:fld id="{AF9E89F8-092D-4D69-ACCB-27EB5FCC0EF4}" type="datetimeFigureOut">
               <a:rPr lang="tr-TR" smtClean="0"/>
-              <a:t>7.11.2019</a:t>
+              <a:t>14.11.2019</a:t>
             </a:fld>
             <a:endParaRPr lang="tr-TR"/>
           </a:p>
@@ -1246,7 +1247,7 @@
           <a:p>
             <a:fld id="{AF9E89F8-092D-4D69-ACCB-27EB5FCC0EF4}" type="datetimeFigureOut">
               <a:rPr lang="tr-TR" smtClean="0"/>
-              <a:t>7.11.2019</a:t>
+              <a:t>14.11.2019</a:t>
             </a:fld>
             <a:endParaRPr lang="tr-TR"/>
           </a:p>
@@ -1613,7 +1614,7 @@
           <a:p>
             <a:fld id="{AF9E89F8-092D-4D69-ACCB-27EB5FCC0EF4}" type="datetimeFigureOut">
               <a:rPr lang="tr-TR" smtClean="0"/>
-              <a:t>7.11.2019</a:t>
+              <a:t>14.11.2019</a:t>
             </a:fld>
             <a:endParaRPr lang="tr-TR"/>
           </a:p>
@@ -1731,7 +1732,7 @@
           <a:p>
             <a:fld id="{AF9E89F8-092D-4D69-ACCB-27EB5FCC0EF4}" type="datetimeFigureOut">
               <a:rPr lang="tr-TR" smtClean="0"/>
-              <a:t>7.11.2019</a:t>
+              <a:t>14.11.2019</a:t>
             </a:fld>
             <a:endParaRPr lang="tr-TR"/>
           </a:p>
@@ -1826,7 +1827,7 @@
           <a:p>
             <a:fld id="{AF9E89F8-092D-4D69-ACCB-27EB5FCC0EF4}" type="datetimeFigureOut">
               <a:rPr lang="tr-TR" smtClean="0"/>
-              <a:t>7.11.2019</a:t>
+              <a:t>14.11.2019</a:t>
             </a:fld>
             <a:endParaRPr lang="tr-TR"/>
           </a:p>
@@ -2103,7 +2104,7 @@
           <a:p>
             <a:fld id="{AF9E89F8-092D-4D69-ACCB-27EB5FCC0EF4}" type="datetimeFigureOut">
               <a:rPr lang="tr-TR" smtClean="0"/>
-              <a:t>7.11.2019</a:t>
+              <a:t>14.11.2019</a:t>
             </a:fld>
             <a:endParaRPr lang="tr-TR"/>
           </a:p>
@@ -2356,7 +2357,7 @@
           <a:p>
             <a:fld id="{AF9E89F8-092D-4D69-ACCB-27EB5FCC0EF4}" type="datetimeFigureOut">
               <a:rPr lang="tr-TR" smtClean="0"/>
-              <a:t>7.11.2019</a:t>
+              <a:t>14.11.2019</a:t>
             </a:fld>
             <a:endParaRPr lang="tr-TR"/>
           </a:p>
@@ -2569,7 +2570,7 @@
           <a:p>
             <a:fld id="{AF9E89F8-092D-4D69-ACCB-27EB5FCC0EF4}" type="datetimeFigureOut">
               <a:rPr lang="tr-TR" smtClean="0"/>
-              <a:t>7.11.2019</a:t>
+              <a:t>14.11.2019</a:t>
             </a:fld>
             <a:endParaRPr lang="tr-TR"/>
           </a:p>
@@ -5127,6 +5128,108 @@
       </p:grpSpPr>
       <p:sp>
         <p:nvSpPr>
+          <p:cNvPr id="2" name="Title 1"/>
+          <p:cNvSpPr>
+            <a:spLocks noGrp="1"/>
+          </p:cNvSpPr>
+          <p:nvPr>
+            <p:ph type="title"/>
+          </p:nvPr>
+        </p:nvSpPr>
+        <p:spPr/>
+        <p:txBody>
+          <a:bodyPr/>
+          <a:lstStyle/>
+          <a:p>
+            <a:r>
+              <a:rPr lang="tr-TR" dirty="0" err="1"/>
+              <a:t>Errors</a:t>
+            </a:r>
+            <a:endParaRPr lang="en-US" dirty="0"/>
+          </a:p>
+        </p:txBody>
+      </p:sp>
+      <p:sp>
+        <p:nvSpPr>
+          <p:cNvPr id="5" name="Content Placeholder 4"/>
+          <p:cNvSpPr>
+            <a:spLocks noGrp="1"/>
+          </p:cNvSpPr>
+          <p:nvPr>
+            <p:ph idx="1"/>
+          </p:nvPr>
+        </p:nvSpPr>
+        <p:spPr/>
+        <p:txBody>
+          <a:bodyPr/>
+          <a:lstStyle/>
+          <a:p>
+            <a:endParaRPr lang="tr-TR" dirty="0"/>
+          </a:p>
+        </p:txBody>
+      </p:sp>
+      <p:pic>
+        <p:nvPicPr>
+          <p:cNvPr id="3" name="Resim 2">
+            <a:extLst>
+              <a:ext uri="{FF2B5EF4-FFF2-40B4-BE49-F238E27FC236}">
+                <a16:creationId xmlns:a16="http://schemas.microsoft.com/office/drawing/2014/main" id="{B1F35554-7ACB-4610-A012-863E7164AD39}"/>
+              </a:ext>
+            </a:extLst>
+          </p:cNvPr>
+          <p:cNvPicPr>
+            <a:picLocks noChangeAspect="1"/>
+          </p:cNvPicPr>
+          <p:nvPr/>
+        </p:nvPicPr>
+        <p:blipFill>
+          <a:blip r:embed="rId2"/>
+          <a:stretch>
+            <a:fillRect/>
+          </a:stretch>
+        </p:blipFill>
+        <p:spPr>
+          <a:xfrm>
+            <a:off x="2935026" y="1162689"/>
+            <a:ext cx="6613708" cy="5330186"/>
+          </a:xfrm>
+          <a:prstGeom prst="rect">
+            <a:avLst/>
+          </a:prstGeom>
+        </p:spPr>
+      </p:pic>
+    </p:spTree>
+    <p:extLst>
+      <p:ext uri="{BB962C8B-B14F-4D97-AF65-F5344CB8AC3E}">
+        <p14:creationId xmlns:p14="http://schemas.microsoft.com/office/powerpoint/2010/main" val="3946255162"/>
+      </p:ext>
+    </p:extLst>
+  </p:cSld>
+  <p:clrMapOvr>
+    <a:masterClrMapping/>
+  </p:clrMapOvr>
+</p:sld>
+</file>
+
+<file path=ppt/slides/slide6.xml><?xml version="1.0" encoding="utf-8"?>
+<p:sld xmlns:a="http://schemas.openxmlformats.org/drawingml/2006/main" xmlns:r="http://schemas.openxmlformats.org/officeDocument/2006/relationships" xmlns:p="http://schemas.openxmlformats.org/presentationml/2006/main">
+  <p:cSld>
+    <p:spTree>
+      <p:nvGrpSpPr>
+        <p:cNvPr id="1" name=""/>
+        <p:cNvGrpSpPr/>
+        <p:nvPr/>
+      </p:nvGrpSpPr>
+      <p:grpSpPr>
+        <a:xfrm>
+          <a:off x="0" y="0"/>
+          <a:ext cx="0" cy="0"/>
+          <a:chOff x="0" y="0"/>
+          <a:chExt cx="0" cy="0"/>
+        </a:xfrm>
+      </p:grpSpPr>
+      <p:sp>
+        <p:nvSpPr>
           <p:cNvPr id="2" name="Başlık 1">
             <a:extLst>
               <a:ext uri="{FF2B5EF4-FFF2-40B4-BE49-F238E27FC236}">
@@ -5141,13 +5244,18 @@
             <p:ph type="title"/>
           </p:nvPr>
         </p:nvSpPr>
-        <p:spPr/>
-        <p:txBody>
-          <a:bodyPr/>
-          <a:lstStyle/>
-          <a:p>
-            <a:r>
-              <a:rPr lang="tr-TR" dirty="0" err="1"/>
+        <p:spPr>
+          <a:xfrm>
+            <a:off x="838200" y="365125"/>
+            <a:ext cx="10515600" cy="1325563"/>
+          </a:xfrm>
+        </p:spPr>
+        <p:txBody>
+          <a:bodyPr/>
+          <a:lstStyle/>
+          <a:p>
+            <a:r>
+              <a:rPr lang="tr-TR"/>
               <a:t>Conclusion&amp;Remarks</a:t>
             </a:r>
             <a:endParaRPr lang="en-US" dirty="0"/>
@@ -5230,7 +5338,7 @@
 </p:sld>
 </file>
 
-<file path=ppt/slides/slide6.xml><?xml version="1.0" encoding="utf-8"?>
+<file path=ppt/slides/slide7.xml><?xml version="1.0" encoding="utf-8"?>
 <p:sld xmlns:a="http://schemas.openxmlformats.org/drawingml/2006/main" xmlns:r="http://schemas.openxmlformats.org/officeDocument/2006/relationships" xmlns:p="http://schemas.openxmlformats.org/presentationml/2006/main">
   <p:cSld>
     <p:spTree>

</xml_diff>